<commit_message>
update file báo cáo ppt
</commit_message>
<xml_diff>
--- a/Datawarehouse.pptx
+++ b/Datawarehouse.pptx
@@ -573,7 +573,7 @@
           <a:noFill/>
           <a:extLst>
             <a:ext uri="{909E8E84-426E-40dd-AFC4-6F175D3DCCD1}">
-              <a14:hiddenFill xmlns="" xmlns:a14="http://schemas.microsoft.com/office/drawing/2010/main">
+              <a14:hiddenFill xmlns:a14="http://schemas.microsoft.com/office/drawing/2010/main" xmlns="">
                 <a:solidFill>
                   <a:srgbClr val="FFFFFF"/>
                 </a:solidFill>
@@ -633,7 +633,7 @@
             </a:ln>
             <a:extLst>
               <a:ext uri="{91240B29-F687-4f45-9708-019B960494DF}">
-                <a14:hiddenLine xmlns="" xmlns:a14="http://schemas.microsoft.com/office/drawing/2010/main" w="9525">
+                <a14:hiddenLine xmlns:a14="http://schemas.microsoft.com/office/drawing/2010/main" xmlns="" w="9525">
                   <a:solidFill>
                     <a:srgbClr val="000000"/>
                   </a:solidFill>
@@ -723,7 +723,7 @@
             </a:ln>
             <a:extLst>
               <a:ext uri="{91240B29-F687-4f45-9708-019B960494DF}">
-                <a14:hiddenLine xmlns="" xmlns:a14="http://schemas.microsoft.com/office/drawing/2010/main" w="9525">
+                <a14:hiddenLine xmlns:a14="http://schemas.microsoft.com/office/drawing/2010/main" xmlns="" w="9525">
                   <a:solidFill>
                     <a:srgbClr val="000000"/>
                   </a:solidFill>
@@ -813,7 +813,7 @@
             </a:ln>
             <a:extLst>
               <a:ext uri="{91240B29-F687-4f45-9708-019B960494DF}">
-                <a14:hiddenLine xmlns="" xmlns:a14="http://schemas.microsoft.com/office/drawing/2010/main" w="9525">
+                <a14:hiddenLine xmlns:a14="http://schemas.microsoft.com/office/drawing/2010/main" xmlns="" w="9525">
                   <a:solidFill>
                     <a:srgbClr val="000000"/>
                   </a:solidFill>
@@ -847,7 +847,7 @@
             </a:ln>
             <a:extLst>
               <a:ext uri="{91240B29-F687-4f45-9708-019B960494DF}">
-                <a14:hiddenLine xmlns="" xmlns:a14="http://schemas.microsoft.com/office/drawing/2010/main" w="9525">
+                <a14:hiddenLine xmlns:a14="http://schemas.microsoft.com/office/drawing/2010/main" xmlns="" w="9525">
                   <a:solidFill>
                     <a:srgbClr val="000000"/>
                   </a:solidFill>
@@ -937,7 +937,7 @@
             </a:ln>
             <a:extLst>
               <a:ext uri="{91240B29-F687-4f45-9708-019B960494DF}">
-                <a14:hiddenLine xmlns="" xmlns:a14="http://schemas.microsoft.com/office/drawing/2010/main" w="9525">
+                <a14:hiddenLine xmlns:a14="http://schemas.microsoft.com/office/drawing/2010/main" xmlns="" w="9525">
                   <a:solidFill>
                     <a:srgbClr val="000000"/>
                   </a:solidFill>
@@ -999,7 +999,7 @@
             </a:ln>
             <a:extLst>
               <a:ext uri="{91240B29-F687-4f45-9708-019B960494DF}">
-                <a14:hiddenLine xmlns="" xmlns:a14="http://schemas.microsoft.com/office/drawing/2010/main" w="9525">
+                <a14:hiddenLine xmlns:a14="http://schemas.microsoft.com/office/drawing/2010/main" xmlns="" w="9525">
                   <a:solidFill>
                     <a:srgbClr val="000000"/>
                   </a:solidFill>
@@ -1061,7 +1061,7 @@
             </a:ln>
             <a:extLst>
               <a:ext uri="{91240B29-F687-4f45-9708-019B960494DF}">
-                <a14:hiddenLine xmlns="" xmlns:a14="http://schemas.microsoft.com/office/drawing/2010/main" w="9525">
+                <a14:hiddenLine xmlns:a14="http://schemas.microsoft.com/office/drawing/2010/main" xmlns="" w="9525">
                   <a:solidFill>
                     <a:srgbClr val="000000"/>
                   </a:solidFill>
@@ -1151,7 +1151,7 @@
             </a:ln>
             <a:extLst>
               <a:ext uri="{91240B29-F687-4f45-9708-019B960494DF}">
-                <a14:hiddenLine xmlns="" xmlns:a14="http://schemas.microsoft.com/office/drawing/2010/main" w="9525">
+                <a14:hiddenLine xmlns:a14="http://schemas.microsoft.com/office/drawing/2010/main" xmlns="" w="9525">
                   <a:solidFill>
                     <a:srgbClr val="000000"/>
                   </a:solidFill>
@@ -1213,7 +1213,7 @@
             </a:ln>
             <a:extLst>
               <a:ext uri="{91240B29-F687-4f45-9708-019B960494DF}">
-                <a14:hiddenLine xmlns="" xmlns:a14="http://schemas.microsoft.com/office/drawing/2010/main" w="9525">
+                <a14:hiddenLine xmlns:a14="http://schemas.microsoft.com/office/drawing/2010/main" xmlns="" w="9525">
                   <a:solidFill>
                     <a:srgbClr val="000000"/>
                   </a:solidFill>
@@ -1275,7 +1275,7 @@
             </a:ln>
             <a:extLst>
               <a:ext uri="{91240B29-F687-4f45-9708-019B960494DF}">
-                <a14:hiddenLine xmlns="" xmlns:a14="http://schemas.microsoft.com/office/drawing/2010/main" w="9525">
+                <a14:hiddenLine xmlns:a14="http://schemas.microsoft.com/office/drawing/2010/main" xmlns="" w="9525">
                   <a:solidFill>
                     <a:srgbClr val="000000"/>
                   </a:solidFill>
@@ -1365,7 +1365,7 @@
             </a:ln>
             <a:extLst>
               <a:ext uri="{91240B29-F687-4f45-9708-019B960494DF}">
-                <a14:hiddenLine xmlns="" xmlns:a14="http://schemas.microsoft.com/office/drawing/2010/main" w="9525">
+                <a14:hiddenLine xmlns:a14="http://schemas.microsoft.com/office/drawing/2010/main" xmlns="" w="9525">
                   <a:solidFill>
                     <a:srgbClr val="000000"/>
                   </a:solidFill>
@@ -1455,7 +1455,7 @@
             </a:ln>
             <a:extLst>
               <a:ext uri="{91240B29-F687-4f45-9708-019B960494DF}">
-                <a14:hiddenLine xmlns="" xmlns:a14="http://schemas.microsoft.com/office/drawing/2010/main" w="9525">
+                <a14:hiddenLine xmlns:a14="http://schemas.microsoft.com/office/drawing/2010/main" xmlns="" w="9525">
                   <a:solidFill>
                     <a:srgbClr val="000000"/>
                   </a:solidFill>
@@ -1517,7 +1517,7 @@
             </a:ln>
             <a:extLst>
               <a:ext uri="{91240B29-F687-4f45-9708-019B960494DF}">
-                <a14:hiddenLine xmlns="" xmlns:a14="http://schemas.microsoft.com/office/drawing/2010/main" w="9525">
+                <a14:hiddenLine xmlns:a14="http://schemas.microsoft.com/office/drawing/2010/main" xmlns="" w="9525">
                   <a:solidFill>
                     <a:srgbClr val="000000"/>
                   </a:solidFill>
@@ -1627,7 +1627,7 @@
             </a:ln>
             <a:extLst>
               <a:ext uri="{91240B29-F687-4f45-9708-019B960494DF}">
-                <a14:hiddenLine xmlns="" xmlns:a14="http://schemas.microsoft.com/office/drawing/2010/main" w="9525">
+                <a14:hiddenLine xmlns:a14="http://schemas.microsoft.com/office/drawing/2010/main" xmlns="" w="9525">
                   <a:solidFill>
                     <a:srgbClr val="000000"/>
                   </a:solidFill>
@@ -1689,7 +1689,7 @@
             </a:ln>
             <a:extLst>
               <a:ext uri="{91240B29-F687-4f45-9708-019B960494DF}">
-                <a14:hiddenLine xmlns="" xmlns:a14="http://schemas.microsoft.com/office/drawing/2010/main" w="9525">
+                <a14:hiddenLine xmlns:a14="http://schemas.microsoft.com/office/drawing/2010/main" xmlns="" w="9525">
                   <a:solidFill>
                     <a:srgbClr val="000000"/>
                   </a:solidFill>
@@ -1779,7 +1779,7 @@
             </a:ln>
             <a:extLst>
               <a:ext uri="{91240B29-F687-4f45-9708-019B960494DF}">
-                <a14:hiddenLine xmlns="" xmlns:a14="http://schemas.microsoft.com/office/drawing/2010/main" w="9525">
+                <a14:hiddenLine xmlns:a14="http://schemas.microsoft.com/office/drawing/2010/main" xmlns="" w="9525">
                   <a:solidFill>
                     <a:srgbClr val="000000"/>
                   </a:solidFill>
@@ -1869,7 +1869,7 @@
             </a:ln>
             <a:extLst>
               <a:ext uri="{91240B29-F687-4f45-9708-019B960494DF}">
-                <a14:hiddenLine xmlns="" xmlns:a14="http://schemas.microsoft.com/office/drawing/2010/main" w="9525">
+                <a14:hiddenLine xmlns:a14="http://schemas.microsoft.com/office/drawing/2010/main" xmlns="" w="9525">
                   <a:solidFill>
                     <a:srgbClr val="000000"/>
                   </a:solidFill>
@@ -1931,7 +1931,7 @@
             </a:ln>
             <a:extLst>
               <a:ext uri="{91240B29-F687-4f45-9708-019B960494DF}">
-                <a14:hiddenLine xmlns="" xmlns:a14="http://schemas.microsoft.com/office/drawing/2010/main" w="9525">
+                <a14:hiddenLine xmlns:a14="http://schemas.microsoft.com/office/drawing/2010/main" xmlns="" w="9525">
                   <a:solidFill>
                     <a:srgbClr val="000000"/>
                   </a:solidFill>
@@ -2021,7 +2021,7 @@
             </a:ln>
             <a:extLst>
               <a:ext uri="{91240B29-F687-4f45-9708-019B960494DF}">
-                <a14:hiddenLine xmlns="" xmlns:a14="http://schemas.microsoft.com/office/drawing/2010/main" w="9525">
+                <a14:hiddenLine xmlns:a14="http://schemas.microsoft.com/office/drawing/2010/main" xmlns="" w="9525">
                   <a:solidFill>
                     <a:srgbClr val="000000"/>
                   </a:solidFill>
@@ -2111,7 +2111,7 @@
             </a:ln>
             <a:extLst>
               <a:ext uri="{91240B29-F687-4f45-9708-019B960494DF}">
-                <a14:hiddenLine xmlns="" xmlns:a14="http://schemas.microsoft.com/office/drawing/2010/main" w="9525">
+                <a14:hiddenLine xmlns:a14="http://schemas.microsoft.com/office/drawing/2010/main" xmlns="" w="9525">
                   <a:solidFill>
                     <a:srgbClr val="000000"/>
                   </a:solidFill>
@@ -2167,7 +2167,7 @@
             </a:ln>
             <a:extLst>
               <a:ext uri="{91240B29-F687-4f45-9708-019B960494DF}">
-                <a14:hiddenLine xmlns="" xmlns:a14="http://schemas.microsoft.com/office/drawing/2010/main" w="9525">
+                <a14:hiddenLine xmlns:a14="http://schemas.microsoft.com/office/drawing/2010/main" xmlns="" w="9525">
                   <a:solidFill>
                     <a:srgbClr val="000000"/>
                   </a:solidFill>
@@ -2257,7 +2257,7 @@
             </a:ln>
             <a:extLst>
               <a:ext uri="{91240B29-F687-4f45-9708-019B960494DF}">
-                <a14:hiddenLine xmlns="" xmlns:a14="http://schemas.microsoft.com/office/drawing/2010/main" w="9525">
+                <a14:hiddenLine xmlns:a14="http://schemas.microsoft.com/office/drawing/2010/main" xmlns="" w="9525">
                   <a:solidFill>
                     <a:srgbClr val="000000"/>
                   </a:solidFill>
@@ -2313,7 +2313,7 @@
             </a:ln>
             <a:extLst>
               <a:ext uri="{91240B29-F687-4f45-9708-019B960494DF}">
-                <a14:hiddenLine xmlns="" xmlns:a14="http://schemas.microsoft.com/office/drawing/2010/main" w="9525">
+                <a14:hiddenLine xmlns:a14="http://schemas.microsoft.com/office/drawing/2010/main" xmlns="" w="9525">
                   <a:solidFill>
                     <a:srgbClr val="000000"/>
                   </a:solidFill>
@@ -2403,7 +2403,7 @@
             </a:ln>
             <a:extLst>
               <a:ext uri="{91240B29-F687-4f45-9708-019B960494DF}">
-                <a14:hiddenLine xmlns="" xmlns:a14="http://schemas.microsoft.com/office/drawing/2010/main" w="9525">
+                <a14:hiddenLine xmlns:a14="http://schemas.microsoft.com/office/drawing/2010/main" xmlns="" w="9525">
                   <a:solidFill>
                     <a:srgbClr val="000000"/>
                   </a:solidFill>
@@ -2471,7 +2471,7 @@
             </a:ln>
             <a:extLst>
               <a:ext uri="{91240B29-F687-4f45-9708-019B960494DF}">
-                <a14:hiddenLine xmlns="" xmlns:a14="http://schemas.microsoft.com/office/drawing/2010/main" w="9525">
+                <a14:hiddenLine xmlns:a14="http://schemas.microsoft.com/office/drawing/2010/main" xmlns="" w="9525">
                   <a:solidFill>
                     <a:srgbClr val="000000"/>
                   </a:solidFill>
@@ -2561,7 +2561,7 @@
             </a:ln>
             <a:extLst>
               <a:ext uri="{91240B29-F687-4f45-9708-019B960494DF}">
-                <a14:hiddenLine xmlns="" xmlns:a14="http://schemas.microsoft.com/office/drawing/2010/main" w="9525">
+                <a14:hiddenLine xmlns:a14="http://schemas.microsoft.com/office/drawing/2010/main" xmlns="" w="9525">
                   <a:solidFill>
                     <a:srgbClr val="000000"/>
                   </a:solidFill>
@@ -2629,7 +2629,7 @@
             </a:ln>
             <a:extLst>
               <a:ext uri="{91240B29-F687-4f45-9708-019B960494DF}">
-                <a14:hiddenLine xmlns="" xmlns:a14="http://schemas.microsoft.com/office/drawing/2010/main" w="9525">
+                <a14:hiddenLine xmlns:a14="http://schemas.microsoft.com/office/drawing/2010/main" xmlns="" w="9525">
                   <a:solidFill>
                     <a:srgbClr val="000000"/>
                   </a:solidFill>
@@ -2719,7 +2719,7 @@
             </a:ln>
             <a:extLst>
               <a:ext uri="{91240B29-F687-4f45-9708-019B960494DF}">
-                <a14:hiddenLine xmlns="" xmlns:a14="http://schemas.microsoft.com/office/drawing/2010/main" w="9525">
+                <a14:hiddenLine xmlns:a14="http://schemas.microsoft.com/office/drawing/2010/main" xmlns="" w="9525">
                   <a:solidFill>
                     <a:srgbClr val="000000"/>
                   </a:solidFill>
@@ -2753,7 +2753,7 @@
             </a:ln>
             <a:extLst>
               <a:ext uri="{91240B29-F687-4f45-9708-019B960494DF}">
-                <a14:hiddenLine xmlns="" xmlns:a14="http://schemas.microsoft.com/office/drawing/2010/main" w="9525">
+                <a14:hiddenLine xmlns:a14="http://schemas.microsoft.com/office/drawing/2010/main" xmlns="" w="9525">
                   <a:solidFill>
                     <a:srgbClr val="000000"/>
                   </a:solidFill>
@@ -2843,7 +2843,7 @@
             </a:ln>
             <a:extLst>
               <a:ext uri="{91240B29-F687-4f45-9708-019B960494DF}">
-                <a14:hiddenLine xmlns="" xmlns:a14="http://schemas.microsoft.com/office/drawing/2010/main" w="9525">
+                <a14:hiddenLine xmlns:a14="http://schemas.microsoft.com/office/drawing/2010/main" xmlns="" w="9525">
                   <a:solidFill>
                     <a:srgbClr val="000000"/>
                   </a:solidFill>
@@ -2905,7 +2905,7 @@
             </a:ln>
             <a:extLst>
               <a:ext uri="{91240B29-F687-4f45-9708-019B960494DF}">
-                <a14:hiddenLine xmlns="" xmlns:a14="http://schemas.microsoft.com/office/drawing/2010/main" w="9525">
+                <a14:hiddenLine xmlns:a14="http://schemas.microsoft.com/office/drawing/2010/main" xmlns="" w="9525">
                   <a:solidFill>
                     <a:srgbClr val="000000"/>
                   </a:solidFill>
@@ -2967,7 +2967,7 @@
             </a:ln>
             <a:extLst>
               <a:ext uri="{91240B29-F687-4f45-9708-019B960494DF}">
-                <a14:hiddenLine xmlns="" xmlns:a14="http://schemas.microsoft.com/office/drawing/2010/main" w="9525">
+                <a14:hiddenLine xmlns:a14="http://schemas.microsoft.com/office/drawing/2010/main" xmlns="" w="9525">
                   <a:solidFill>
                     <a:srgbClr val="000000"/>
                   </a:solidFill>
@@ -3057,7 +3057,7 @@
             </a:ln>
             <a:extLst>
               <a:ext uri="{91240B29-F687-4f45-9708-019B960494DF}">
-                <a14:hiddenLine xmlns="" xmlns:a14="http://schemas.microsoft.com/office/drawing/2010/main" w="9525">
+                <a14:hiddenLine xmlns:a14="http://schemas.microsoft.com/office/drawing/2010/main" xmlns="" w="9525">
                   <a:solidFill>
                     <a:srgbClr val="000000"/>
                   </a:solidFill>
@@ -3125,7 +3125,7 @@
             </a:ln>
             <a:extLst>
               <a:ext uri="{91240B29-F687-4f45-9708-019B960494DF}">
-                <a14:hiddenLine xmlns="" xmlns:a14="http://schemas.microsoft.com/office/drawing/2010/main" w="9525">
+                <a14:hiddenLine xmlns:a14="http://schemas.microsoft.com/office/drawing/2010/main" xmlns="" w="9525">
                   <a:solidFill>
                     <a:srgbClr val="000000"/>
                   </a:solidFill>
@@ -3187,7 +3187,7 @@
             </a:ln>
             <a:extLst>
               <a:ext uri="{91240B29-F687-4f45-9708-019B960494DF}">
-                <a14:hiddenLine xmlns="" xmlns:a14="http://schemas.microsoft.com/office/drawing/2010/main" w="9525">
+                <a14:hiddenLine xmlns:a14="http://schemas.microsoft.com/office/drawing/2010/main" xmlns="" w="9525">
                   <a:solidFill>
                     <a:srgbClr val="000000"/>
                   </a:solidFill>
@@ -3277,7 +3277,7 @@
             </a:ln>
             <a:extLst>
               <a:ext uri="{91240B29-F687-4f45-9708-019B960494DF}">
-                <a14:hiddenLine xmlns="" xmlns:a14="http://schemas.microsoft.com/office/drawing/2010/main" w="9525">
+                <a14:hiddenLine xmlns:a14="http://schemas.microsoft.com/office/drawing/2010/main" xmlns="" w="9525">
                   <a:solidFill>
                     <a:srgbClr val="000000"/>
                   </a:solidFill>
@@ -3339,7 +3339,7 @@
             </a:ln>
             <a:extLst>
               <a:ext uri="{91240B29-F687-4f45-9708-019B960494DF}">
-                <a14:hiddenLine xmlns="" xmlns:a14="http://schemas.microsoft.com/office/drawing/2010/main" w="9525">
+                <a14:hiddenLine xmlns:a14="http://schemas.microsoft.com/office/drawing/2010/main" xmlns="" w="9525">
                   <a:solidFill>
                     <a:srgbClr val="000000"/>
                   </a:solidFill>
@@ -3429,7 +3429,7 @@
             </a:ln>
             <a:extLst>
               <a:ext uri="{91240B29-F687-4f45-9708-019B960494DF}">
-                <a14:hiddenLine xmlns="" xmlns:a14="http://schemas.microsoft.com/office/drawing/2010/main" w="9525">
+                <a14:hiddenLine xmlns:a14="http://schemas.microsoft.com/office/drawing/2010/main" xmlns="" w="9525">
                   <a:solidFill>
                     <a:srgbClr val="000000"/>
                   </a:solidFill>
@@ -3491,7 +3491,7 @@
             </a:ln>
             <a:extLst>
               <a:ext uri="{91240B29-F687-4f45-9708-019B960494DF}">
-                <a14:hiddenLine xmlns="" xmlns:a14="http://schemas.microsoft.com/office/drawing/2010/main" w="9525">
+                <a14:hiddenLine xmlns:a14="http://schemas.microsoft.com/office/drawing/2010/main" xmlns="" w="9525">
                   <a:solidFill>
                     <a:srgbClr val="000000"/>
                   </a:solidFill>
@@ -3581,7 +3581,7 @@
             </a:ln>
             <a:extLst>
               <a:ext uri="{91240B29-F687-4f45-9708-019B960494DF}">
-                <a14:hiddenLine xmlns="" xmlns:a14="http://schemas.microsoft.com/office/drawing/2010/main" w="9525">
+                <a14:hiddenLine xmlns:a14="http://schemas.microsoft.com/office/drawing/2010/main" xmlns="" w="9525">
                   <a:solidFill>
                     <a:srgbClr val="000000"/>
                   </a:solidFill>
@@ -3615,7 +3615,7 @@
             </a:ln>
             <a:extLst>
               <a:ext uri="{91240B29-F687-4f45-9708-019B960494DF}">
-                <a14:hiddenLine xmlns="" xmlns:a14="http://schemas.microsoft.com/office/drawing/2010/main" w="9525">
+                <a14:hiddenLine xmlns:a14="http://schemas.microsoft.com/office/drawing/2010/main" xmlns="" w="9525">
                   <a:solidFill>
                     <a:srgbClr val="000000"/>
                   </a:solidFill>
@@ -3680,7 +3680,7 @@
             </a:ln>
             <a:extLst>
               <a:ext uri="{91240B29-F687-4f45-9708-019B960494DF}">
-                <a14:hiddenLine xmlns="" xmlns:a14="http://schemas.microsoft.com/office/drawing/2010/main" w="9525">
+                <a14:hiddenLine xmlns:a14="http://schemas.microsoft.com/office/drawing/2010/main" xmlns="" w="9525">
                   <a:solidFill>
                     <a:srgbClr val="000000"/>
                   </a:solidFill>
@@ -3770,7 +3770,7 @@
             </a:ln>
             <a:extLst>
               <a:ext uri="{91240B29-F687-4f45-9708-019B960494DF}">
-                <a14:hiddenLine xmlns="" xmlns:a14="http://schemas.microsoft.com/office/drawing/2010/main" w="9525">
+                <a14:hiddenLine xmlns:a14="http://schemas.microsoft.com/office/drawing/2010/main" xmlns="" w="9525">
                   <a:solidFill>
                     <a:srgbClr val="000000"/>
                   </a:solidFill>
@@ -3832,7 +3832,7 @@
             </a:ln>
             <a:extLst>
               <a:ext uri="{91240B29-F687-4f45-9708-019B960494DF}">
-                <a14:hiddenLine xmlns="" xmlns:a14="http://schemas.microsoft.com/office/drawing/2010/main" w="9525">
+                <a14:hiddenLine xmlns:a14="http://schemas.microsoft.com/office/drawing/2010/main" xmlns="" w="9525">
                   <a:solidFill>
                     <a:srgbClr val="000000"/>
                   </a:solidFill>
@@ -3922,7 +3922,7 @@
             </a:ln>
             <a:extLst>
               <a:ext uri="{91240B29-F687-4f45-9708-019B960494DF}">
-                <a14:hiddenLine xmlns="" xmlns:a14="http://schemas.microsoft.com/office/drawing/2010/main" w="9525">
+                <a14:hiddenLine xmlns:a14="http://schemas.microsoft.com/office/drawing/2010/main" xmlns="" w="9525">
                   <a:solidFill>
                     <a:srgbClr val="000000"/>
                   </a:solidFill>
@@ -4012,7 +4012,7 @@
             </a:ln>
             <a:extLst>
               <a:ext uri="{91240B29-F687-4f45-9708-019B960494DF}">
-                <a14:hiddenLine xmlns="" xmlns:a14="http://schemas.microsoft.com/office/drawing/2010/main" w="9525">
+                <a14:hiddenLine xmlns:a14="http://schemas.microsoft.com/office/drawing/2010/main" xmlns="" w="9525">
                   <a:solidFill>
                     <a:srgbClr val="000000"/>
                   </a:solidFill>
@@ -4077,7 +4077,7 @@
             </a:ln>
             <a:extLst>
               <a:ext uri="{91240B29-F687-4f45-9708-019B960494DF}">
-                <a14:hiddenLine xmlns="" xmlns:a14="http://schemas.microsoft.com/office/drawing/2010/main" w="9525">
+                <a14:hiddenLine xmlns:a14="http://schemas.microsoft.com/office/drawing/2010/main" xmlns="" w="9525">
                   <a:solidFill>
                     <a:srgbClr val="000000"/>
                   </a:solidFill>
@@ -4139,7 +4139,7 @@
             </a:ln>
             <a:extLst>
               <a:ext uri="{91240B29-F687-4f45-9708-019B960494DF}">
-                <a14:hiddenLine xmlns="" xmlns:a14="http://schemas.microsoft.com/office/drawing/2010/main" w="9525">
+                <a14:hiddenLine xmlns:a14="http://schemas.microsoft.com/office/drawing/2010/main" xmlns="" w="9525">
                   <a:solidFill>
                     <a:srgbClr val="000000"/>
                   </a:solidFill>
@@ -4229,7 +4229,7 @@
             </a:ln>
             <a:extLst>
               <a:ext uri="{91240B29-F687-4f45-9708-019B960494DF}">
-                <a14:hiddenLine xmlns="" xmlns:a14="http://schemas.microsoft.com/office/drawing/2010/main" w="9525">
+                <a14:hiddenLine xmlns:a14="http://schemas.microsoft.com/office/drawing/2010/main" xmlns="" w="9525">
                   <a:solidFill>
                     <a:srgbClr val="000000"/>
                   </a:solidFill>
@@ -4319,7 +4319,7 @@
             </a:ln>
             <a:extLst>
               <a:ext uri="{91240B29-F687-4f45-9708-019B960494DF}">
-                <a14:hiddenLine xmlns="" xmlns:a14="http://schemas.microsoft.com/office/drawing/2010/main" w="9525">
+                <a14:hiddenLine xmlns:a14="http://schemas.microsoft.com/office/drawing/2010/main" xmlns="" w="9525">
                   <a:solidFill>
                     <a:srgbClr val="000000"/>
                   </a:solidFill>
@@ -4381,7 +4381,7 @@
             </a:ln>
             <a:extLst>
               <a:ext uri="{91240B29-F687-4f45-9708-019B960494DF}">
-                <a14:hiddenLine xmlns="" xmlns:a14="http://schemas.microsoft.com/office/drawing/2010/main" w="9525">
+                <a14:hiddenLine xmlns:a14="http://schemas.microsoft.com/office/drawing/2010/main" xmlns="" w="9525">
                   <a:solidFill>
                     <a:srgbClr val="000000"/>
                   </a:solidFill>
@@ -4501,7 +4501,7 @@
             </a:ln>
             <a:extLst>
               <a:ext uri="{91240B29-F687-4f45-9708-019B960494DF}">
-                <a14:hiddenLine xmlns="" xmlns:a14="http://schemas.microsoft.com/office/drawing/2010/main" w="9525">
+                <a14:hiddenLine xmlns:a14="http://schemas.microsoft.com/office/drawing/2010/main" xmlns="" w="9525">
                   <a:solidFill>
                     <a:srgbClr val="000000"/>
                   </a:solidFill>
@@ -4569,7 +4569,7 @@
             </a:ln>
             <a:extLst>
               <a:ext uri="{91240B29-F687-4f45-9708-019B960494DF}">
-                <a14:hiddenLine xmlns="" xmlns:a14="http://schemas.microsoft.com/office/drawing/2010/main" w="9525">
+                <a14:hiddenLine xmlns:a14="http://schemas.microsoft.com/office/drawing/2010/main" xmlns="" w="9525">
                   <a:solidFill>
                     <a:srgbClr val="000000"/>
                   </a:solidFill>
@@ -4659,7 +4659,7 @@
             </a:ln>
             <a:extLst>
               <a:ext uri="{91240B29-F687-4f45-9708-019B960494DF}">
-                <a14:hiddenLine xmlns="" xmlns:a14="http://schemas.microsoft.com/office/drawing/2010/main" w="9525">
+                <a14:hiddenLine xmlns:a14="http://schemas.microsoft.com/office/drawing/2010/main" xmlns="" w="9525">
                   <a:solidFill>
                     <a:srgbClr val="000000"/>
                   </a:solidFill>
@@ -9466,7 +9466,7 @@
           <a:noFill/>
           <a:extLst>
             <a:ext uri="{909E8E84-426E-40dd-AFC4-6F175D3DCCD1}">
-              <a14:hiddenFill xmlns="" xmlns:a14="http://schemas.microsoft.com/office/drawing/2010/main">
+              <a14:hiddenFill xmlns:a14="http://schemas.microsoft.com/office/drawing/2010/main" xmlns="">
                 <a:solidFill>
                   <a:srgbClr val="FFFFFF"/>
                 </a:solidFill>
@@ -9540,7 +9540,7 @@
               </a:ln>
               <a:extLst>
                 <a:ext uri="{91240B29-F687-4f45-9708-019B960494DF}">
-                  <a14:hiddenLine xmlns="" xmlns:a14="http://schemas.microsoft.com/office/drawing/2010/main" w="9525">
+                  <a14:hiddenLine xmlns:a14="http://schemas.microsoft.com/office/drawing/2010/main" xmlns="" w="9525">
                     <a:solidFill>
                       <a:srgbClr val="000000"/>
                     </a:solidFill>
@@ -9630,7 +9630,7 @@
               </a:ln>
               <a:extLst>
                 <a:ext uri="{91240B29-F687-4f45-9708-019B960494DF}">
-                  <a14:hiddenLine xmlns="" xmlns:a14="http://schemas.microsoft.com/office/drawing/2010/main" w="9525">
+                  <a14:hiddenLine xmlns:a14="http://schemas.microsoft.com/office/drawing/2010/main" xmlns="" w="9525">
                     <a:solidFill>
                       <a:srgbClr val="000000"/>
                     </a:solidFill>
@@ -9720,7 +9720,7 @@
               </a:ln>
               <a:extLst>
                 <a:ext uri="{91240B29-F687-4f45-9708-019B960494DF}">
-                  <a14:hiddenLine xmlns="" xmlns:a14="http://schemas.microsoft.com/office/drawing/2010/main" w="9525">
+                  <a14:hiddenLine xmlns:a14="http://schemas.microsoft.com/office/drawing/2010/main" xmlns="" w="9525">
                     <a:solidFill>
                       <a:srgbClr val="000000"/>
                     </a:solidFill>
@@ -9782,7 +9782,7 @@
               </a:ln>
               <a:extLst>
                 <a:ext uri="{91240B29-F687-4f45-9708-019B960494DF}">
-                  <a14:hiddenLine xmlns="" xmlns:a14="http://schemas.microsoft.com/office/drawing/2010/main" w="9525">
+                  <a14:hiddenLine xmlns:a14="http://schemas.microsoft.com/office/drawing/2010/main" xmlns="" w="9525">
                     <a:solidFill>
                       <a:srgbClr val="000000"/>
                     </a:solidFill>
@@ -9872,7 +9872,7 @@
               </a:ln>
               <a:extLst>
                 <a:ext uri="{91240B29-F687-4f45-9708-019B960494DF}">
-                  <a14:hiddenLine xmlns="" xmlns:a14="http://schemas.microsoft.com/office/drawing/2010/main" w="9525">
+                  <a14:hiddenLine xmlns:a14="http://schemas.microsoft.com/office/drawing/2010/main" xmlns="" w="9525">
                     <a:solidFill>
                       <a:srgbClr val="000000"/>
                     </a:solidFill>
@@ -9934,7 +9934,7 @@
               </a:ln>
               <a:extLst>
                 <a:ext uri="{91240B29-F687-4f45-9708-019B960494DF}">
-                  <a14:hiddenLine xmlns="" xmlns:a14="http://schemas.microsoft.com/office/drawing/2010/main" w="9525">
+                  <a14:hiddenLine xmlns:a14="http://schemas.microsoft.com/office/drawing/2010/main" xmlns="" w="9525">
                     <a:solidFill>
                       <a:srgbClr val="000000"/>
                     </a:solidFill>
@@ -9996,7 +9996,7 @@
               </a:ln>
               <a:extLst>
                 <a:ext uri="{91240B29-F687-4f45-9708-019B960494DF}">
-                  <a14:hiddenLine xmlns="" xmlns:a14="http://schemas.microsoft.com/office/drawing/2010/main" w="9525">
+                  <a14:hiddenLine xmlns:a14="http://schemas.microsoft.com/office/drawing/2010/main" xmlns="" w="9525">
                     <a:solidFill>
                       <a:srgbClr val="000000"/>
                     </a:solidFill>
@@ -10086,7 +10086,7 @@
               </a:ln>
               <a:extLst>
                 <a:ext uri="{91240B29-F687-4f45-9708-019B960494DF}">
-                  <a14:hiddenLine xmlns="" xmlns:a14="http://schemas.microsoft.com/office/drawing/2010/main" w="9525">
+                  <a14:hiddenLine xmlns:a14="http://schemas.microsoft.com/office/drawing/2010/main" xmlns="" w="9525">
                     <a:solidFill>
                       <a:srgbClr val="000000"/>
                     </a:solidFill>
@@ -10176,7 +10176,7 @@
               </a:ln>
               <a:extLst>
                 <a:ext uri="{91240B29-F687-4f45-9708-019B960494DF}">
-                  <a14:hiddenLine xmlns="" xmlns:a14="http://schemas.microsoft.com/office/drawing/2010/main" w="9525">
+                  <a14:hiddenLine xmlns:a14="http://schemas.microsoft.com/office/drawing/2010/main" xmlns="" w="9525">
                     <a:solidFill>
                       <a:srgbClr val="000000"/>
                     </a:solidFill>
@@ -10238,7 +10238,7 @@
               </a:ln>
               <a:extLst>
                 <a:ext uri="{91240B29-F687-4f45-9708-019B960494DF}">
-                  <a14:hiddenLine xmlns="" xmlns:a14="http://schemas.microsoft.com/office/drawing/2010/main" w="9525">
+                  <a14:hiddenLine xmlns:a14="http://schemas.microsoft.com/office/drawing/2010/main" xmlns="" w="9525">
                     <a:solidFill>
                       <a:srgbClr val="000000"/>
                     </a:solidFill>
@@ -10348,7 +10348,7 @@
               </a:ln>
               <a:extLst>
                 <a:ext uri="{91240B29-F687-4f45-9708-019B960494DF}">
-                  <a14:hiddenLine xmlns="" xmlns:a14="http://schemas.microsoft.com/office/drawing/2010/main" w="9525">
+                  <a14:hiddenLine xmlns:a14="http://schemas.microsoft.com/office/drawing/2010/main" xmlns="" w="9525">
                     <a:solidFill>
                       <a:srgbClr val="000000"/>
                     </a:solidFill>
@@ -10432,7 +10432,7 @@
               </a:ln>
               <a:extLst>
                 <a:ext uri="{91240B29-F687-4f45-9708-019B960494DF}">
-                  <a14:hiddenLine xmlns="" xmlns:a14="http://schemas.microsoft.com/office/drawing/2010/main" w="9525">
+                  <a14:hiddenLine xmlns:a14="http://schemas.microsoft.com/office/drawing/2010/main" xmlns="" w="9525">
                     <a:solidFill>
                       <a:srgbClr val="000000"/>
                     </a:solidFill>
@@ -10494,7 +10494,7 @@
               </a:ln>
               <a:extLst>
                 <a:ext uri="{91240B29-F687-4f45-9708-019B960494DF}">
-                  <a14:hiddenLine xmlns="" xmlns:a14="http://schemas.microsoft.com/office/drawing/2010/main" w="9525">
+                  <a14:hiddenLine xmlns:a14="http://schemas.microsoft.com/office/drawing/2010/main" xmlns="" w="9525">
                     <a:solidFill>
                       <a:srgbClr val="000000"/>
                     </a:solidFill>
@@ -10556,7 +10556,7 @@
               </a:ln>
               <a:extLst>
                 <a:ext uri="{91240B29-F687-4f45-9708-019B960494DF}">
-                  <a14:hiddenLine xmlns="" xmlns:a14="http://schemas.microsoft.com/office/drawing/2010/main" w="9525">
+                  <a14:hiddenLine xmlns:a14="http://schemas.microsoft.com/office/drawing/2010/main" xmlns="" w="9525">
                     <a:solidFill>
                       <a:srgbClr val="000000"/>
                     </a:solidFill>
@@ -10646,7 +10646,7 @@
               </a:ln>
               <a:extLst>
                 <a:ext uri="{91240B29-F687-4f45-9708-019B960494DF}">
-                  <a14:hiddenLine xmlns="" xmlns:a14="http://schemas.microsoft.com/office/drawing/2010/main" w="9525">
+                  <a14:hiddenLine xmlns:a14="http://schemas.microsoft.com/office/drawing/2010/main" xmlns="" w="9525">
                     <a:solidFill>
                       <a:srgbClr val="000000"/>
                     </a:solidFill>
@@ -10680,7 +10680,7 @@
               </a:ln>
               <a:extLst>
                 <a:ext uri="{91240B29-F687-4f45-9708-019B960494DF}">
-                  <a14:hiddenLine xmlns="" xmlns:a14="http://schemas.microsoft.com/office/drawing/2010/main" w="9525">
+                  <a14:hiddenLine xmlns:a14="http://schemas.microsoft.com/office/drawing/2010/main" xmlns="" w="9525">
                     <a:solidFill>
                       <a:srgbClr val="000000"/>
                     </a:solidFill>
@@ -10745,7 +10745,7 @@
               </a:ln>
               <a:extLst>
                 <a:ext uri="{91240B29-F687-4f45-9708-019B960494DF}">
-                  <a14:hiddenLine xmlns="" xmlns:a14="http://schemas.microsoft.com/office/drawing/2010/main" w="9525">
+                  <a14:hiddenLine xmlns:a14="http://schemas.microsoft.com/office/drawing/2010/main" xmlns="" w="9525">
                     <a:solidFill>
                       <a:srgbClr val="000000"/>
                     </a:solidFill>
@@ -10835,7 +10835,7 @@
               </a:ln>
               <a:extLst>
                 <a:ext uri="{91240B29-F687-4f45-9708-019B960494DF}">
-                  <a14:hiddenLine xmlns="" xmlns:a14="http://schemas.microsoft.com/office/drawing/2010/main" w="9525">
+                  <a14:hiddenLine xmlns:a14="http://schemas.microsoft.com/office/drawing/2010/main" xmlns="" w="9525">
                     <a:solidFill>
                       <a:srgbClr val="000000"/>
                     </a:solidFill>
@@ -10897,7 +10897,7 @@
               </a:ln>
               <a:extLst>
                 <a:ext uri="{91240B29-F687-4f45-9708-019B960494DF}">
-                  <a14:hiddenLine xmlns="" xmlns:a14="http://schemas.microsoft.com/office/drawing/2010/main" w="9525">
+                  <a14:hiddenLine xmlns:a14="http://schemas.microsoft.com/office/drawing/2010/main" xmlns="" w="9525">
                     <a:solidFill>
                       <a:srgbClr val="000000"/>
                     </a:solidFill>
@@ -10987,7 +10987,7 @@
               </a:ln>
               <a:extLst>
                 <a:ext uri="{91240B29-F687-4f45-9708-019B960494DF}">
-                  <a14:hiddenLine xmlns="" xmlns:a14="http://schemas.microsoft.com/office/drawing/2010/main" w="9525">
+                  <a14:hiddenLine xmlns:a14="http://schemas.microsoft.com/office/drawing/2010/main" xmlns="" w="9525">
                     <a:solidFill>
                       <a:srgbClr val="000000"/>
                     </a:solidFill>
@@ -11052,7 +11052,7 @@
               </a:ln>
               <a:extLst>
                 <a:ext uri="{91240B29-F687-4f45-9708-019B960494DF}">
-                  <a14:hiddenLine xmlns="" xmlns:a14="http://schemas.microsoft.com/office/drawing/2010/main" w="9525">
+                  <a14:hiddenLine xmlns:a14="http://schemas.microsoft.com/office/drawing/2010/main" xmlns="" w="9525">
                     <a:solidFill>
                       <a:srgbClr val="000000"/>
                     </a:solidFill>
@@ -11114,7 +11114,7 @@
               </a:ln>
               <a:extLst>
                 <a:ext uri="{91240B29-F687-4f45-9708-019B960494DF}">
-                  <a14:hiddenLine xmlns="" xmlns:a14="http://schemas.microsoft.com/office/drawing/2010/main" w="9525">
+                  <a14:hiddenLine xmlns:a14="http://schemas.microsoft.com/office/drawing/2010/main" xmlns="" w="9525">
                     <a:solidFill>
                       <a:srgbClr val="000000"/>
                     </a:solidFill>
@@ -11204,7 +11204,7 @@
               </a:ln>
               <a:extLst>
                 <a:ext uri="{91240B29-F687-4f45-9708-019B960494DF}">
-                  <a14:hiddenLine xmlns="" xmlns:a14="http://schemas.microsoft.com/office/drawing/2010/main" w="9525">
+                  <a14:hiddenLine xmlns:a14="http://schemas.microsoft.com/office/drawing/2010/main" xmlns="" w="9525">
                     <a:solidFill>
                       <a:srgbClr val="000000"/>
                     </a:solidFill>
@@ -11294,7 +11294,7 @@
               </a:ln>
               <a:extLst>
                 <a:ext uri="{91240B29-F687-4f45-9708-019B960494DF}">
-                  <a14:hiddenLine xmlns="" xmlns:a14="http://schemas.microsoft.com/office/drawing/2010/main" w="9525">
+                  <a14:hiddenLine xmlns:a14="http://schemas.microsoft.com/office/drawing/2010/main" xmlns="" w="9525">
                     <a:solidFill>
                       <a:srgbClr val="000000"/>
                     </a:solidFill>
@@ -11359,7 +11359,7 @@
               </a:ln>
               <a:extLst>
                 <a:ext uri="{91240B29-F687-4f45-9708-019B960494DF}">
-                  <a14:hiddenLine xmlns="" xmlns:a14="http://schemas.microsoft.com/office/drawing/2010/main" w="9525">
+                  <a14:hiddenLine xmlns:a14="http://schemas.microsoft.com/office/drawing/2010/main" xmlns="" w="9525">
                     <a:solidFill>
                       <a:srgbClr val="000000"/>
                     </a:solidFill>
@@ -11479,7 +11479,7 @@
               </a:ln>
               <a:extLst>
                 <a:ext uri="{91240B29-F687-4f45-9708-019B960494DF}">
-                  <a14:hiddenLine xmlns="" xmlns:a14="http://schemas.microsoft.com/office/drawing/2010/main" w="9525">
+                  <a14:hiddenLine xmlns:a14="http://schemas.microsoft.com/office/drawing/2010/main" xmlns="" w="9525">
                     <a:solidFill>
                       <a:srgbClr val="000000"/>
                     </a:solidFill>
@@ -11577,7 +11577,7 @@
               </a:ln>
               <a:extLst>
                 <a:ext uri="{91240B29-F687-4f45-9708-019B960494DF}">
-                  <a14:hiddenLine xmlns="" xmlns:a14="http://schemas.microsoft.com/office/drawing/2010/main" w="9525">
+                  <a14:hiddenLine xmlns:a14="http://schemas.microsoft.com/office/drawing/2010/main" xmlns="" w="9525">
                     <a:solidFill>
                       <a:srgbClr val="000000"/>
                     </a:solidFill>
@@ -11692,7 +11692,7 @@
               </a:ln>
               <a:extLst>
                 <a:ext uri="{91240B29-F687-4f45-9708-019B960494DF}">
-                  <a14:hiddenLine xmlns="" xmlns:a14="http://schemas.microsoft.com/office/drawing/2010/main" w="9525">
+                  <a14:hiddenLine xmlns:a14="http://schemas.microsoft.com/office/drawing/2010/main" xmlns="" w="9525">
                     <a:solidFill>
                       <a:srgbClr val="000000"/>
                     </a:solidFill>
@@ -11782,7 +11782,7 @@
               </a:ln>
               <a:extLst>
                 <a:ext uri="{91240B29-F687-4f45-9708-019B960494DF}">
-                  <a14:hiddenLine xmlns="" xmlns:a14="http://schemas.microsoft.com/office/drawing/2010/main" w="9525">
+                  <a14:hiddenLine xmlns:a14="http://schemas.microsoft.com/office/drawing/2010/main" xmlns="" w="9525">
                     <a:solidFill>
                       <a:srgbClr val="000000"/>
                     </a:solidFill>
@@ -11847,7 +11847,7 @@
               </a:ln>
               <a:extLst>
                 <a:ext uri="{91240B29-F687-4f45-9708-019B960494DF}">
-                  <a14:hiddenLine xmlns="" xmlns:a14="http://schemas.microsoft.com/office/drawing/2010/main" w="9525">
+                  <a14:hiddenLine xmlns:a14="http://schemas.microsoft.com/office/drawing/2010/main" xmlns="" w="9525">
                     <a:solidFill>
                       <a:srgbClr val="000000"/>
                     </a:solidFill>
@@ -11937,7 +11937,7 @@
               </a:ln>
               <a:extLst>
                 <a:ext uri="{91240B29-F687-4f45-9708-019B960494DF}">
-                  <a14:hiddenLine xmlns="" xmlns:a14="http://schemas.microsoft.com/office/drawing/2010/main" w="9525">
+                  <a14:hiddenLine xmlns:a14="http://schemas.microsoft.com/office/drawing/2010/main" xmlns="" w="9525">
                     <a:solidFill>
                       <a:srgbClr val="000000"/>
                     </a:solidFill>
@@ -12005,7 +12005,7 @@
               </a:ln>
               <a:extLst>
                 <a:ext uri="{91240B29-F687-4f45-9708-019B960494DF}">
-                  <a14:hiddenLine xmlns="" xmlns:a14="http://schemas.microsoft.com/office/drawing/2010/main" w="9525">
+                  <a14:hiddenLine xmlns:a14="http://schemas.microsoft.com/office/drawing/2010/main" xmlns="" w="9525">
                     <a:solidFill>
                       <a:srgbClr val="000000"/>
                     </a:solidFill>
@@ -12095,7 +12095,7 @@
               </a:ln>
               <a:extLst>
                 <a:ext uri="{91240B29-F687-4f45-9708-019B960494DF}">
-                  <a14:hiddenLine xmlns="" xmlns:a14="http://schemas.microsoft.com/office/drawing/2010/main" w="9525">
+                  <a14:hiddenLine xmlns:a14="http://schemas.microsoft.com/office/drawing/2010/main" xmlns="" w="9525">
                     <a:solidFill>
                       <a:srgbClr val="000000"/>
                     </a:solidFill>
@@ -12163,7 +12163,7 @@
               </a:ln>
               <a:extLst>
                 <a:ext uri="{91240B29-F687-4f45-9708-019B960494DF}">
-                  <a14:hiddenLine xmlns="" xmlns:a14="http://schemas.microsoft.com/office/drawing/2010/main" w="9525">
+                  <a14:hiddenLine xmlns:a14="http://schemas.microsoft.com/office/drawing/2010/main" xmlns="" w="9525">
                     <a:solidFill>
                       <a:srgbClr val="000000"/>
                     </a:solidFill>
@@ -12253,7 +12253,7 @@
               </a:ln>
               <a:extLst>
                 <a:ext uri="{91240B29-F687-4f45-9708-019B960494DF}">
-                  <a14:hiddenLine xmlns="" xmlns:a14="http://schemas.microsoft.com/office/drawing/2010/main" w="9525">
+                  <a14:hiddenLine xmlns:a14="http://schemas.microsoft.com/office/drawing/2010/main" xmlns="" w="9525">
                     <a:solidFill>
                       <a:srgbClr val="000000"/>
                     </a:solidFill>
@@ -12287,7 +12287,7 @@
               </a:ln>
               <a:extLst>
                 <a:ext uri="{91240B29-F687-4f45-9708-019B960494DF}">
-                  <a14:hiddenLine xmlns="" xmlns:a14="http://schemas.microsoft.com/office/drawing/2010/main" w="9525">
+                  <a14:hiddenLine xmlns:a14="http://schemas.microsoft.com/office/drawing/2010/main" xmlns="" w="9525">
                     <a:solidFill>
                       <a:srgbClr val="000000"/>
                     </a:solidFill>
@@ -14141,7 +14141,7 @@
       </p:sp>
       <p:pic>
         <p:nvPicPr>
-          <p:cNvPr id="4" name="Picture 3"/>
+          <p:cNvPr id="2" name="Picture 1"/>
           <p:cNvPicPr>
             <a:picLocks noChangeAspect="1"/>
           </p:cNvPicPr>
@@ -14161,8 +14161,8 @@
         </p:blipFill>
         <p:spPr>
           <a:xfrm>
-            <a:off x="4809981" y="203200"/>
-            <a:ext cx="4638820" cy="6349349"/>
+            <a:off x="4771880" y="152400"/>
+            <a:ext cx="4740420" cy="6488414"/>
           </a:xfrm>
           <a:prstGeom prst="rect">
             <a:avLst/>

</xml_diff>

<commit_message>
ghi chứ lại code bước 2 và chỉnh ảnh bước 2 trong pptx
</commit_message>
<xml_diff>
--- a/Datawarehouse.pptx
+++ b/Datawarehouse.pptx
@@ -202,7 +202,7 @@
           <a:p>
             <a:fld id="{3EFD42F7-718C-4B98-AAEC-167E6DDD60A7}" type="datetimeFigureOut">
               <a:rPr lang="en-US" smtClean="0"/>
-              <a:t>8/8/2020</a:t>
+              <a:t>8/9/2020</a:t>
             </a:fld>
             <a:endParaRPr lang="en-US"/>
           </a:p>
@@ -4699,7 +4699,7 @@
           </a:lstStyle>
           <a:p>
             <a:r>
-              <a:rPr lang="en-US" smtClean="0"/>
+              <a:rPr lang="en-US"/>
               <a:t>Click to edit Master title style</a:t>
             </a:r>
             <a:endParaRPr lang="en-US" dirty="0"/>
@@ -4770,7 +4770,7 @@
           </a:lstStyle>
           <a:p>
             <a:r>
-              <a:rPr lang="en-US" smtClean="0"/>
+              <a:rPr lang="en-US"/>
               <a:t>Click to edit Master subtitle style</a:t>
             </a:r>
             <a:endParaRPr lang="en-US" dirty="0"/>
@@ -4799,7 +4799,7 @@
           <a:p>
             <a:fld id="{AA6B33E2-E582-49CA-B802-EA2BFF3F3A0C}" type="datetimeFigureOut">
               <a:rPr lang="en-US" smtClean="0"/>
-              <a:t>8/8/2020</a:t>
+              <a:t>8/9/2020</a:t>
             </a:fld>
             <a:endParaRPr lang="en-US"/>
           </a:p>
@@ -4914,7 +4914,7 @@
           </a:lstStyle>
           <a:p>
             <a:r>
-              <a:rPr lang="en-US" smtClean="0"/>
+              <a:rPr lang="en-US"/>
               <a:t>Click to edit Master title style</a:t>
             </a:r>
             <a:endParaRPr lang="en-US" dirty="0"/>
@@ -4975,7 +4975,7 @@
               <a:buNone/>
             </a:pPr>
             <a:r>
-              <a:rPr lang="en-US" smtClean="0"/>
+              <a:rPr lang="en-US"/>
               <a:t>Click icon to add picture</a:t>
             </a:r>
             <a:endParaRPr lang="en-US" dirty="0"/>
@@ -5043,7 +5043,7 @@
           <a:p>
             <a:pPr lvl="0"/>
             <a:r>
-              <a:rPr lang="en-US" smtClean="0"/>
+              <a:rPr lang="en-US"/>
               <a:t>Edit Master text styles</a:t>
             </a:r>
           </a:p>
@@ -5066,7 +5066,7 @@
           <a:p>
             <a:fld id="{AA6B33E2-E582-49CA-B802-EA2BFF3F3A0C}" type="datetimeFigureOut">
               <a:rPr lang="en-US" smtClean="0"/>
-              <a:t>8/8/2020</a:t>
+              <a:t>8/9/2020</a:t>
             </a:fld>
             <a:endParaRPr lang="en-US"/>
           </a:p>
@@ -5171,7 +5171,7 @@
           </a:lstStyle>
           <a:p>
             <a:r>
-              <a:rPr lang="en-US" smtClean="0"/>
+              <a:rPr lang="en-US"/>
               <a:t>Click to edit Master title style</a:t>
             </a:r>
             <a:endParaRPr lang="en-US" dirty="0"/>
@@ -5239,7 +5239,7 @@
           <a:p>
             <a:pPr lvl="0"/>
             <a:r>
-              <a:rPr lang="en-US" smtClean="0"/>
+              <a:rPr lang="en-US"/>
               <a:t>Edit Master text styles</a:t>
             </a:r>
           </a:p>
@@ -5262,7 +5262,7 @@
           <a:p>
             <a:fld id="{AA6B33E2-E582-49CA-B802-EA2BFF3F3A0C}" type="datetimeFigureOut">
               <a:rPr lang="en-US" smtClean="0"/>
-              <a:t>8/8/2020</a:t>
+              <a:t>8/9/2020</a:t>
             </a:fld>
             <a:endParaRPr lang="en-US"/>
           </a:p>
@@ -5367,7 +5367,7 @@
           </a:lstStyle>
           <a:p>
             <a:r>
-              <a:rPr lang="en-US" smtClean="0"/>
+              <a:rPr lang="en-US"/>
               <a:t>Click to edit Master title style</a:t>
             </a:r>
             <a:endParaRPr lang="en-US" dirty="0"/>
@@ -5435,7 +5435,7 @@
           <a:p>
             <a:pPr lvl="0"/>
             <a:r>
-              <a:rPr lang="en-US" smtClean="0"/>
+              <a:rPr lang="en-US"/>
               <a:t>Edit Master text styles</a:t>
             </a:r>
           </a:p>
@@ -5502,7 +5502,7 @@
           <a:p>
             <a:pPr lvl="0"/>
             <a:r>
-              <a:rPr lang="en-US" smtClean="0"/>
+              <a:rPr lang="en-US"/>
               <a:t>Edit Master text styles</a:t>
             </a:r>
           </a:p>
@@ -5525,7 +5525,7 @@
           <a:p>
             <a:fld id="{AA6B33E2-E582-49CA-B802-EA2BFF3F3A0C}" type="datetimeFigureOut">
               <a:rPr lang="en-US" smtClean="0"/>
-              <a:t>8/8/2020</a:t>
+              <a:t>8/9/2020</a:t>
             </a:fld>
             <a:endParaRPr lang="en-US"/>
           </a:p>
@@ -5868,7 +5868,7 @@
           </a:lstStyle>
           <a:p>
             <a:r>
-              <a:rPr lang="en-US" smtClean="0"/>
+              <a:rPr lang="en-US"/>
               <a:t>Click to edit Master title style</a:t>
             </a:r>
             <a:endParaRPr lang="en-US" dirty="0"/>
@@ -5936,7 +5936,7 @@
           <a:p>
             <a:pPr lvl="0"/>
             <a:r>
-              <a:rPr lang="en-US" smtClean="0"/>
+              <a:rPr lang="en-US"/>
               <a:t>Edit Master text styles</a:t>
             </a:r>
           </a:p>
@@ -5959,7 +5959,7 @@
           <a:p>
             <a:fld id="{AA6B33E2-E582-49CA-B802-EA2BFF3F3A0C}" type="datetimeFigureOut">
               <a:rPr lang="en-US" smtClean="0"/>
-              <a:t>8/8/2020</a:t>
+              <a:t>8/9/2020</a:t>
             </a:fld>
             <a:endParaRPr lang="en-US"/>
           </a:p>
@@ -6058,7 +6058,7 @@
           <a:lstStyle/>
           <a:p>
             <a:r>
-              <a:rPr lang="en-US" smtClean="0"/>
+              <a:rPr lang="en-US"/>
               <a:t>Click to edit Master title style</a:t>
             </a:r>
             <a:endParaRPr lang="en-US" dirty="0"/>
@@ -6133,7 +6133,7 @@
           <a:p>
             <a:pPr lvl="0"/>
             <a:r>
-              <a:rPr lang="en-US" smtClean="0"/>
+              <a:rPr lang="en-US"/>
               <a:t>Edit Master text styles</a:t>
             </a:r>
           </a:p>
@@ -6200,7 +6200,7 @@
           <a:p>
             <a:pPr lvl="0"/>
             <a:r>
-              <a:rPr lang="en-US" smtClean="0"/>
+              <a:rPr lang="en-US"/>
               <a:t>Edit Master text styles</a:t>
             </a:r>
           </a:p>
@@ -6274,7 +6274,7 @@
           <a:p>
             <a:pPr lvl="0"/>
             <a:r>
-              <a:rPr lang="en-US" smtClean="0"/>
+              <a:rPr lang="en-US"/>
               <a:t>Edit Master text styles</a:t>
             </a:r>
           </a:p>
@@ -6341,7 +6341,7 @@
           <a:p>
             <a:pPr lvl="0"/>
             <a:r>
-              <a:rPr lang="en-US" smtClean="0"/>
+              <a:rPr lang="en-US"/>
               <a:t>Edit Master text styles</a:t>
             </a:r>
           </a:p>
@@ -6415,7 +6415,7 @@
           <a:p>
             <a:pPr lvl="0"/>
             <a:r>
-              <a:rPr lang="en-US" smtClean="0"/>
+              <a:rPr lang="en-US"/>
               <a:t>Edit Master text styles</a:t>
             </a:r>
           </a:p>
@@ -6482,7 +6482,7 @@
           <a:p>
             <a:pPr lvl="0"/>
             <a:r>
-              <a:rPr lang="en-US" smtClean="0"/>
+              <a:rPr lang="en-US"/>
               <a:t>Edit Master text styles</a:t>
             </a:r>
           </a:p>
@@ -6505,7 +6505,7 @@
           <a:p>
             <a:fld id="{AA6B33E2-E582-49CA-B802-EA2BFF3F3A0C}" type="datetimeFigureOut">
               <a:rPr lang="en-US" smtClean="0"/>
-              <a:t>8/8/2020</a:t>
+              <a:t>8/9/2020</a:t>
             </a:fld>
             <a:endParaRPr lang="en-US"/>
           </a:p>
@@ -6604,7 +6604,7 @@
           <a:lstStyle/>
           <a:p>
             <a:r>
-              <a:rPr lang="en-US" smtClean="0"/>
+              <a:rPr lang="en-US"/>
               <a:t>Click to edit Master title style</a:t>
             </a:r>
             <a:endParaRPr lang="en-US" dirty="0"/>
@@ -6679,7 +6679,7 @@
           <a:p>
             <a:pPr lvl="0"/>
             <a:r>
-              <a:rPr lang="en-US" smtClean="0"/>
+              <a:rPr lang="en-US"/>
               <a:t>Edit Master text styles</a:t>
             </a:r>
           </a:p>
@@ -6736,7 +6736,7 @@
               <a:buNone/>
             </a:pPr>
             <a:r>
-              <a:rPr lang="en-US" smtClean="0"/>
+              <a:rPr lang="en-US"/>
               <a:t>Click icon to add picture</a:t>
             </a:r>
             <a:endParaRPr lang="en-US" dirty="0"/>
@@ -6804,7 +6804,7 @@
           <a:p>
             <a:pPr lvl="0"/>
             <a:r>
-              <a:rPr lang="en-US" smtClean="0"/>
+              <a:rPr lang="en-US"/>
               <a:t>Edit Master text styles</a:t>
             </a:r>
           </a:p>
@@ -6878,7 +6878,7 @@
           <a:p>
             <a:pPr lvl="0"/>
             <a:r>
-              <a:rPr lang="en-US" smtClean="0"/>
+              <a:rPr lang="en-US"/>
               <a:t>Edit Master text styles</a:t>
             </a:r>
           </a:p>
@@ -6935,7 +6935,7 @@
               <a:buNone/>
             </a:pPr>
             <a:r>
-              <a:rPr lang="en-US" smtClean="0"/>
+              <a:rPr lang="en-US"/>
               <a:t>Click icon to add picture</a:t>
             </a:r>
             <a:endParaRPr lang="en-US" dirty="0"/>
@@ -7003,7 +7003,7 @@
           <a:p>
             <a:pPr lvl="0"/>
             <a:r>
-              <a:rPr lang="en-US" smtClean="0"/>
+              <a:rPr lang="en-US"/>
               <a:t>Edit Master text styles</a:t>
             </a:r>
           </a:p>
@@ -7077,7 +7077,7 @@
           <a:p>
             <a:pPr lvl="0"/>
             <a:r>
-              <a:rPr lang="en-US" smtClean="0"/>
+              <a:rPr lang="en-US"/>
               <a:t>Edit Master text styles</a:t>
             </a:r>
           </a:p>
@@ -7134,7 +7134,7 @@
               <a:buNone/>
             </a:pPr>
             <a:r>
-              <a:rPr lang="en-US" smtClean="0"/>
+              <a:rPr lang="en-US"/>
               <a:t>Click icon to add picture</a:t>
             </a:r>
             <a:endParaRPr lang="en-US" dirty="0"/>
@@ -7202,7 +7202,7 @@
           <a:p>
             <a:pPr lvl="0"/>
             <a:r>
-              <a:rPr lang="en-US" smtClean="0"/>
+              <a:rPr lang="en-US"/>
               <a:t>Edit Master text styles</a:t>
             </a:r>
           </a:p>
@@ -7225,7 +7225,7 @@
           <a:p>
             <a:fld id="{AA6B33E2-E582-49CA-B802-EA2BFF3F3A0C}" type="datetimeFigureOut">
               <a:rPr lang="en-US" smtClean="0"/>
-              <a:t>8/8/2020</a:t>
+              <a:t>8/9/2020</a:t>
             </a:fld>
             <a:endParaRPr lang="en-US"/>
           </a:p>
@@ -7319,7 +7319,7 @@
           <a:lstStyle/>
           <a:p>
             <a:r>
-              <a:rPr lang="en-US" smtClean="0"/>
+              <a:rPr lang="en-US"/>
               <a:t>Click to edit Master title style</a:t>
             </a:r>
             <a:endParaRPr lang="en-US" dirty="0"/>
@@ -7343,35 +7343,35 @@
           <a:p>
             <a:pPr lvl="0"/>
             <a:r>
-              <a:rPr lang="en-US" smtClean="0"/>
+              <a:rPr lang="en-US"/>
               <a:t>Edit Master text styles</a:t>
             </a:r>
           </a:p>
           <a:p>
             <a:pPr lvl="1"/>
             <a:r>
-              <a:rPr lang="en-US" smtClean="0"/>
+              <a:rPr lang="en-US"/>
               <a:t>Second level</a:t>
             </a:r>
           </a:p>
           <a:p>
             <a:pPr lvl="2"/>
             <a:r>
-              <a:rPr lang="en-US" smtClean="0"/>
+              <a:rPr lang="en-US"/>
               <a:t>Third level</a:t>
             </a:r>
           </a:p>
           <a:p>
             <a:pPr lvl="3"/>
             <a:r>
-              <a:rPr lang="en-US" smtClean="0"/>
+              <a:rPr lang="en-US"/>
               <a:t>Fourth level</a:t>
             </a:r>
           </a:p>
           <a:p>
             <a:pPr lvl="4"/>
             <a:r>
-              <a:rPr lang="en-US" smtClean="0"/>
+              <a:rPr lang="en-US"/>
               <a:t>Fifth level</a:t>
             </a:r>
             <a:endParaRPr lang="en-US" dirty="0"/>
@@ -7395,7 +7395,7 @@
           <a:p>
             <a:fld id="{AA6B33E2-E582-49CA-B802-EA2BFF3F3A0C}" type="datetimeFigureOut">
               <a:rPr lang="en-US" smtClean="0"/>
-              <a:t>8/8/2020</a:t>
+              <a:t>8/9/2020</a:t>
             </a:fld>
             <a:endParaRPr lang="en-US"/>
           </a:p>
@@ -7494,7 +7494,7 @@
           <a:lstStyle/>
           <a:p>
             <a:r>
-              <a:rPr lang="en-US" smtClean="0"/>
+              <a:rPr lang="en-US"/>
               <a:t>Click to edit Master title style</a:t>
             </a:r>
             <a:endParaRPr lang="en-US" dirty="0"/>
@@ -7523,35 +7523,35 @@
           <a:p>
             <a:pPr lvl="0"/>
             <a:r>
-              <a:rPr lang="en-US" smtClean="0"/>
+              <a:rPr lang="en-US"/>
               <a:t>Edit Master text styles</a:t>
             </a:r>
           </a:p>
           <a:p>
             <a:pPr lvl="1"/>
             <a:r>
-              <a:rPr lang="en-US" smtClean="0"/>
+              <a:rPr lang="en-US"/>
               <a:t>Second level</a:t>
             </a:r>
           </a:p>
           <a:p>
             <a:pPr lvl="2"/>
             <a:r>
-              <a:rPr lang="en-US" smtClean="0"/>
+              <a:rPr lang="en-US"/>
               <a:t>Third level</a:t>
             </a:r>
           </a:p>
           <a:p>
             <a:pPr lvl="3"/>
             <a:r>
-              <a:rPr lang="en-US" smtClean="0"/>
+              <a:rPr lang="en-US"/>
               <a:t>Fourth level</a:t>
             </a:r>
           </a:p>
           <a:p>
             <a:pPr lvl="4"/>
             <a:r>
-              <a:rPr lang="en-US" smtClean="0"/>
+              <a:rPr lang="en-US"/>
               <a:t>Fifth level</a:t>
             </a:r>
             <a:endParaRPr lang="en-US" dirty="0"/>
@@ -7575,7 +7575,7 @@
           <a:p>
             <a:fld id="{AA6B33E2-E582-49CA-B802-EA2BFF3F3A0C}" type="datetimeFigureOut">
               <a:rPr lang="en-US" smtClean="0"/>
-              <a:t>8/8/2020</a:t>
+              <a:t>8/9/2020</a:t>
             </a:fld>
             <a:endParaRPr lang="en-US"/>
           </a:p>
@@ -7669,7 +7669,7 @@
           <a:lstStyle/>
           <a:p>
             <a:r>
-              <a:rPr lang="en-US" smtClean="0"/>
+              <a:rPr lang="en-US"/>
               <a:t>Click to edit Master title style</a:t>
             </a:r>
             <a:endParaRPr lang="en-US" dirty="0"/>
@@ -7693,35 +7693,35 @@
           <a:p>
             <a:pPr lvl="0"/>
             <a:r>
-              <a:rPr lang="en-US" smtClean="0"/>
+              <a:rPr lang="en-US"/>
               <a:t>Edit Master text styles</a:t>
             </a:r>
           </a:p>
           <a:p>
             <a:pPr lvl="1"/>
             <a:r>
-              <a:rPr lang="en-US" smtClean="0"/>
+              <a:rPr lang="en-US"/>
               <a:t>Second level</a:t>
             </a:r>
           </a:p>
           <a:p>
             <a:pPr lvl="2"/>
             <a:r>
-              <a:rPr lang="en-US" smtClean="0"/>
+              <a:rPr lang="en-US"/>
               <a:t>Third level</a:t>
             </a:r>
           </a:p>
           <a:p>
             <a:pPr lvl="3"/>
             <a:r>
-              <a:rPr lang="en-US" smtClean="0"/>
+              <a:rPr lang="en-US"/>
               <a:t>Fourth level</a:t>
             </a:r>
           </a:p>
           <a:p>
             <a:pPr lvl="4"/>
             <a:r>
-              <a:rPr lang="en-US" smtClean="0"/>
+              <a:rPr lang="en-US"/>
               <a:t>Fifth level</a:t>
             </a:r>
             <a:endParaRPr lang="en-US" dirty="0"/>
@@ -7745,7 +7745,7 @@
           <a:p>
             <a:fld id="{AA6B33E2-E582-49CA-B802-EA2BFF3F3A0C}" type="datetimeFigureOut">
               <a:rPr lang="en-US" smtClean="0"/>
-              <a:t>8/8/2020</a:t>
+              <a:t>8/9/2020</a:t>
             </a:fld>
             <a:endParaRPr lang="en-US"/>
           </a:p>
@@ -7850,7 +7850,7 @@
           </a:lstStyle>
           <a:p>
             <a:r>
-              <a:rPr lang="en-US" smtClean="0"/>
+              <a:rPr lang="en-US"/>
               <a:t>Click to edit Master title style</a:t>
             </a:r>
             <a:endParaRPr lang="en-US" dirty="0"/>
@@ -7972,7 +7972,7 @@
           <a:p>
             <a:pPr lvl="0"/>
             <a:r>
-              <a:rPr lang="en-US" smtClean="0"/>
+              <a:rPr lang="en-US"/>
               <a:t>Edit Master text styles</a:t>
             </a:r>
           </a:p>
@@ -7995,7 +7995,7 @@
           <a:p>
             <a:fld id="{AA6B33E2-E582-49CA-B802-EA2BFF3F3A0C}" type="datetimeFigureOut">
               <a:rPr lang="en-US" smtClean="0"/>
-              <a:t>8/8/2020</a:t>
+              <a:t>8/9/2020</a:t>
             </a:fld>
             <a:endParaRPr lang="en-US"/>
           </a:p>
@@ -8089,7 +8089,7 @@
           <a:lstStyle/>
           <a:p>
             <a:r>
-              <a:rPr lang="en-US" smtClean="0"/>
+              <a:rPr lang="en-US"/>
               <a:t>Click to edit Master title style</a:t>
             </a:r>
             <a:endParaRPr lang="en-US" dirty="0"/>
@@ -8118,35 +8118,35 @@
           <a:p>
             <a:pPr lvl="0"/>
             <a:r>
-              <a:rPr lang="en-US" smtClean="0"/>
+              <a:rPr lang="en-US"/>
               <a:t>Edit Master text styles</a:t>
             </a:r>
           </a:p>
           <a:p>
             <a:pPr lvl="1"/>
             <a:r>
-              <a:rPr lang="en-US" smtClean="0"/>
+              <a:rPr lang="en-US"/>
               <a:t>Second level</a:t>
             </a:r>
           </a:p>
           <a:p>
             <a:pPr lvl="2"/>
             <a:r>
-              <a:rPr lang="en-US" smtClean="0"/>
+              <a:rPr lang="en-US"/>
               <a:t>Third level</a:t>
             </a:r>
           </a:p>
           <a:p>
             <a:pPr lvl="3"/>
             <a:r>
-              <a:rPr lang="en-US" smtClean="0"/>
+              <a:rPr lang="en-US"/>
               <a:t>Fourth level</a:t>
             </a:r>
           </a:p>
           <a:p>
             <a:pPr lvl="4"/>
             <a:r>
-              <a:rPr lang="en-US" smtClean="0"/>
+              <a:rPr lang="en-US"/>
               <a:t>Fifth level</a:t>
             </a:r>
             <a:endParaRPr lang="en-US" dirty="0"/>
@@ -8175,35 +8175,35 @@
           <a:p>
             <a:pPr lvl="0"/>
             <a:r>
-              <a:rPr lang="en-US" smtClean="0"/>
+              <a:rPr lang="en-US"/>
               <a:t>Edit Master text styles</a:t>
             </a:r>
           </a:p>
           <a:p>
             <a:pPr lvl="1"/>
             <a:r>
-              <a:rPr lang="en-US" smtClean="0"/>
+              <a:rPr lang="en-US"/>
               <a:t>Second level</a:t>
             </a:r>
           </a:p>
           <a:p>
             <a:pPr lvl="2"/>
             <a:r>
-              <a:rPr lang="en-US" smtClean="0"/>
+              <a:rPr lang="en-US"/>
               <a:t>Third level</a:t>
             </a:r>
           </a:p>
           <a:p>
             <a:pPr lvl="3"/>
             <a:r>
-              <a:rPr lang="en-US" smtClean="0"/>
+              <a:rPr lang="en-US"/>
               <a:t>Fourth level</a:t>
             </a:r>
           </a:p>
           <a:p>
             <a:pPr lvl="4"/>
             <a:r>
-              <a:rPr lang="en-US" smtClean="0"/>
+              <a:rPr lang="en-US"/>
               <a:t>Fifth level</a:t>
             </a:r>
             <a:endParaRPr lang="en-US" dirty="0"/>
@@ -8227,7 +8227,7 @@
           <a:p>
             <a:fld id="{AA6B33E2-E582-49CA-B802-EA2BFF3F3A0C}" type="datetimeFigureOut">
               <a:rPr lang="en-US" smtClean="0"/>
-              <a:t>8/8/2020</a:t>
+              <a:t>8/9/2020</a:t>
             </a:fld>
             <a:endParaRPr lang="en-US"/>
           </a:p>
@@ -8326,7 +8326,7 @@
           <a:lstStyle/>
           <a:p>
             <a:r>
-              <a:rPr lang="en-US" smtClean="0"/>
+              <a:rPr lang="en-US"/>
               <a:t>Click to edit Master title style</a:t>
             </a:r>
             <a:endParaRPr lang="en-US" dirty="0"/>
@@ -8399,7 +8399,7 @@
           <a:p>
             <a:pPr lvl="0"/>
             <a:r>
-              <a:rPr lang="en-US" smtClean="0"/>
+              <a:rPr lang="en-US"/>
               <a:t>Edit Master text styles</a:t>
             </a:r>
           </a:p>
@@ -8427,35 +8427,35 @@
           <a:p>
             <a:pPr lvl="0"/>
             <a:r>
-              <a:rPr lang="en-US" smtClean="0"/>
+              <a:rPr lang="en-US"/>
               <a:t>Edit Master text styles</a:t>
             </a:r>
           </a:p>
           <a:p>
             <a:pPr lvl="1"/>
             <a:r>
-              <a:rPr lang="en-US" smtClean="0"/>
+              <a:rPr lang="en-US"/>
               <a:t>Second level</a:t>
             </a:r>
           </a:p>
           <a:p>
             <a:pPr lvl="2"/>
             <a:r>
-              <a:rPr lang="en-US" smtClean="0"/>
+              <a:rPr lang="en-US"/>
               <a:t>Third level</a:t>
             </a:r>
           </a:p>
           <a:p>
             <a:pPr lvl="3"/>
             <a:r>
-              <a:rPr lang="en-US" smtClean="0"/>
+              <a:rPr lang="en-US"/>
               <a:t>Fourth level</a:t>
             </a:r>
           </a:p>
           <a:p>
             <a:pPr lvl="4"/>
             <a:r>
-              <a:rPr lang="en-US" smtClean="0"/>
+              <a:rPr lang="en-US"/>
               <a:t>Fifth level</a:t>
             </a:r>
             <a:endParaRPr lang="en-US" dirty="0"/>
@@ -8528,7 +8528,7 @@
           <a:p>
             <a:pPr lvl="0"/>
             <a:r>
-              <a:rPr lang="en-US" smtClean="0"/>
+              <a:rPr lang="en-US"/>
               <a:t>Edit Master text styles</a:t>
             </a:r>
           </a:p>
@@ -8556,35 +8556,35 @@
           <a:p>
             <a:pPr lvl="0"/>
             <a:r>
-              <a:rPr lang="en-US" smtClean="0"/>
+              <a:rPr lang="en-US"/>
               <a:t>Edit Master text styles</a:t>
             </a:r>
           </a:p>
           <a:p>
             <a:pPr lvl="1"/>
             <a:r>
-              <a:rPr lang="en-US" smtClean="0"/>
+              <a:rPr lang="en-US"/>
               <a:t>Second level</a:t>
             </a:r>
           </a:p>
           <a:p>
             <a:pPr lvl="2"/>
             <a:r>
-              <a:rPr lang="en-US" smtClean="0"/>
+              <a:rPr lang="en-US"/>
               <a:t>Third level</a:t>
             </a:r>
           </a:p>
           <a:p>
             <a:pPr lvl="3"/>
             <a:r>
-              <a:rPr lang="en-US" smtClean="0"/>
+              <a:rPr lang="en-US"/>
               <a:t>Fourth level</a:t>
             </a:r>
           </a:p>
           <a:p>
             <a:pPr lvl="4"/>
             <a:r>
-              <a:rPr lang="en-US" smtClean="0"/>
+              <a:rPr lang="en-US"/>
               <a:t>Fifth level</a:t>
             </a:r>
             <a:endParaRPr lang="en-US" dirty="0"/>
@@ -8608,7 +8608,7 @@
           <a:p>
             <a:fld id="{AA6B33E2-E582-49CA-B802-EA2BFF3F3A0C}" type="datetimeFigureOut">
               <a:rPr lang="en-US" smtClean="0"/>
-              <a:t>8/8/2020</a:t>
+              <a:t>8/9/2020</a:t>
             </a:fld>
             <a:endParaRPr lang="en-US"/>
           </a:p>
@@ -8702,7 +8702,7 @@
           <a:lstStyle/>
           <a:p>
             <a:r>
-              <a:rPr lang="en-US" smtClean="0"/>
+              <a:rPr lang="en-US"/>
               <a:t>Click to edit Master title style</a:t>
             </a:r>
             <a:endParaRPr lang="en-US" dirty="0"/>
@@ -8726,7 +8726,7 @@
           <a:p>
             <a:fld id="{AA6B33E2-E582-49CA-B802-EA2BFF3F3A0C}" type="datetimeFigureOut">
               <a:rPr lang="en-US" smtClean="0"/>
-              <a:t>8/8/2020</a:t>
+              <a:t>8/9/2020</a:t>
             </a:fld>
             <a:endParaRPr lang="en-US"/>
           </a:p>
@@ -8821,7 +8821,7 @@
           <a:p>
             <a:fld id="{AA6B33E2-E582-49CA-B802-EA2BFF3F3A0C}" type="datetimeFigureOut">
               <a:rPr lang="en-US" smtClean="0"/>
-              <a:t>8/8/2020</a:t>
+              <a:t>8/9/2020</a:t>
             </a:fld>
             <a:endParaRPr lang="en-US"/>
           </a:p>
@@ -8924,7 +8924,7 @@
           </a:lstStyle>
           <a:p>
             <a:r>
-              <a:rPr lang="en-US" smtClean="0"/>
+              <a:rPr lang="en-US"/>
               <a:t>Click to edit Master title style</a:t>
             </a:r>
             <a:endParaRPr lang="en-US" dirty="0"/>
@@ -8953,35 +8953,35 @@
           <a:p>
             <a:pPr lvl="0"/>
             <a:r>
-              <a:rPr lang="en-US" smtClean="0"/>
+              <a:rPr lang="en-US"/>
               <a:t>Edit Master text styles</a:t>
             </a:r>
           </a:p>
           <a:p>
             <a:pPr lvl="1"/>
             <a:r>
-              <a:rPr lang="en-US" smtClean="0"/>
+              <a:rPr lang="en-US"/>
               <a:t>Second level</a:t>
             </a:r>
           </a:p>
           <a:p>
             <a:pPr lvl="2"/>
             <a:r>
-              <a:rPr lang="en-US" smtClean="0"/>
+              <a:rPr lang="en-US"/>
               <a:t>Third level</a:t>
             </a:r>
           </a:p>
           <a:p>
             <a:pPr lvl="3"/>
             <a:r>
-              <a:rPr lang="en-US" smtClean="0"/>
+              <a:rPr lang="en-US"/>
               <a:t>Fourth level</a:t>
             </a:r>
           </a:p>
           <a:p>
             <a:pPr lvl="4"/>
             <a:r>
-              <a:rPr lang="en-US" smtClean="0"/>
+              <a:rPr lang="en-US"/>
               <a:t>Fifth level</a:t>
             </a:r>
             <a:endParaRPr lang="en-US" dirty="0"/>
@@ -9047,7 +9047,7 @@
           <a:p>
             <a:pPr lvl="0"/>
             <a:r>
-              <a:rPr lang="en-US" smtClean="0"/>
+              <a:rPr lang="en-US"/>
               <a:t>Edit Master text styles</a:t>
             </a:r>
           </a:p>
@@ -9070,7 +9070,7 @@
           <a:p>
             <a:fld id="{AA6B33E2-E582-49CA-B802-EA2BFF3F3A0C}" type="datetimeFigureOut">
               <a:rPr lang="en-US" smtClean="0"/>
-              <a:t>8/8/2020</a:t>
+              <a:t>8/9/2020</a:t>
             </a:fld>
             <a:endParaRPr lang="en-US"/>
           </a:p>
@@ -9173,7 +9173,7 @@
           </a:lstStyle>
           <a:p>
             <a:r>
-              <a:rPr lang="en-US" smtClean="0"/>
+              <a:rPr lang="en-US"/>
               <a:t>Click to edit Master title style</a:t>
             </a:r>
             <a:endParaRPr lang="en-US" dirty="0"/>
@@ -9261,7 +9261,7 @@
           </a:lstStyle>
           <a:p>
             <a:r>
-              <a:rPr lang="en-US" smtClean="0"/>
+              <a:rPr lang="en-US"/>
               <a:t>Click icon to add picture</a:t>
             </a:r>
             <a:endParaRPr lang="en-US" dirty="0"/>
@@ -9327,7 +9327,7 @@
           <a:p>
             <a:pPr lvl="0"/>
             <a:r>
-              <a:rPr lang="en-US" smtClean="0"/>
+              <a:rPr lang="en-US"/>
               <a:t>Edit Master text styles</a:t>
             </a:r>
           </a:p>
@@ -9350,7 +9350,7 @@
           <a:p>
             <a:fld id="{AA6B33E2-E582-49CA-B802-EA2BFF3F3A0C}" type="datetimeFigureOut">
               <a:rPr lang="en-US" smtClean="0"/>
-              <a:t>8/8/2020</a:t>
+              <a:t>8/9/2020</a:t>
             </a:fld>
             <a:endParaRPr lang="en-US"/>
           </a:p>
@@ -12357,35 +12357,35 @@
           <a:p>
             <a:pPr lvl="0"/>
             <a:r>
-              <a:rPr lang="en-US" smtClean="0"/>
+              <a:rPr lang="en-US"/>
               <a:t>Edit Master text styles</a:t>
             </a:r>
           </a:p>
           <a:p>
             <a:pPr lvl="1"/>
             <a:r>
-              <a:rPr lang="en-US" smtClean="0"/>
+              <a:rPr lang="en-US"/>
               <a:t>Second level</a:t>
             </a:r>
           </a:p>
           <a:p>
             <a:pPr lvl="2"/>
             <a:r>
-              <a:rPr lang="en-US" smtClean="0"/>
+              <a:rPr lang="en-US"/>
               <a:t>Third level</a:t>
             </a:r>
           </a:p>
           <a:p>
             <a:pPr lvl="3"/>
             <a:r>
-              <a:rPr lang="en-US" smtClean="0"/>
+              <a:rPr lang="en-US"/>
               <a:t>Fourth level</a:t>
             </a:r>
           </a:p>
           <a:p>
             <a:pPr lvl="4"/>
             <a:r>
-              <a:rPr lang="en-US" smtClean="0"/>
+              <a:rPr lang="en-US"/>
               <a:t>Fifth level</a:t>
             </a:r>
             <a:endParaRPr lang="en-US" dirty="0"/>
@@ -12427,7 +12427,7 @@
           <a:p>
             <a:fld id="{AA6B33E2-E582-49CA-B802-EA2BFF3F3A0C}" type="datetimeFigureOut">
               <a:rPr lang="en-US" smtClean="0"/>
-              <a:t>8/8/2020</a:t>
+              <a:t>8/9/2020</a:t>
             </a:fld>
             <a:endParaRPr lang="en-US"/>
           </a:p>
@@ -12923,13 +12923,6 @@
               </a:rPr>
               <a:t>Data warehouse</a:t>
             </a:r>
-            <a:r>
-              <a:rPr lang="en-US" sz="6000">
-                <a:latin typeface="Times New Roman" panose="02020603050405020304" pitchFamily="18" charset="0"/>
-                <a:cs typeface="Times New Roman" panose="02020603050405020304" pitchFamily="18" charset="0"/>
-              </a:rPr>
-              <a:t/>
-            </a:r>
             <a:br>
               <a:rPr lang="en-US" sz="6000">
                 <a:latin typeface="Times New Roman" panose="02020603050405020304" pitchFamily="18" charset="0"/>
@@ -13042,13 +13035,6 @@
   <p:transition>
     <p:fade/>
   </p:transition>
-  <p:timing>
-    <p:tnLst>
-      <p:par>
-        <p:cTn id="1" dur="indefinite" restart="never" nodeType="tmRoot"/>
-      </p:par>
-    </p:tnLst>
-  </p:timing>
 </p:sld>
 </file>
 
@@ -13760,13 +13746,6 @@
   <p:clrMapOvr>
     <a:masterClrMapping/>
   </p:clrMapOvr>
-  <p:timing>
-    <p:tnLst>
-      <p:par>
-        <p:cTn id="1" dur="indefinite" restart="never" nodeType="tmRoot"/>
-      </p:par>
-    </p:tnLst>
-  </p:timing>
 </p:sld>
 </file>
 
@@ -13979,7 +13958,7 @@
           <a:lstStyle/>
           <a:p>
             <a:r>
-              <a:rPr lang="en-US" sz="2800" smtClean="0">
+              <a:rPr lang="en-US" sz="2800">
                 <a:hlinkClick r:id="rId2"/>
               </a:rPr>
               <a:t>Link vẽ</a:t>
@@ -14023,13 +14002,6 @@
   <p:clrMapOvr>
     <a:masterClrMapping/>
   </p:clrMapOvr>
-  <p:timing>
-    <p:tnLst>
-      <p:par>
-        <p:cTn id="1" dur="indefinite" restart="never" nodeType="tmRoot"/>
-      </p:par>
-    </p:tnLst>
-  </p:timing>
 </p:sld>
 </file>
 
@@ -14081,7 +14053,7 @@
           <a:lstStyle/>
           <a:p>
             <a:r>
-              <a:rPr lang="en-US" sz="2800" smtClean="0">
+              <a:rPr lang="en-US" sz="2800">
                 <a:hlinkClick r:id="rId3"/>
               </a:rPr>
               <a:t>Link vẽ</a:t>
@@ -14174,13 +14146,6 @@
   <p:clrMapOvr>
     <a:masterClrMapping/>
   </p:clrMapOvr>
-  <p:timing>
-    <p:tnLst>
-      <p:par>
-        <p:cTn id="1" dur="indefinite" restart="never" nodeType="tmRoot"/>
-      </p:par>
-    </p:tnLst>
-  </p:timing>
 </p:sld>
 </file>
 
@@ -14219,7 +14184,7 @@
         </p:nvSpPr>
         <p:spPr>
           <a:xfrm>
-            <a:off x="4999023" y="6183150"/>
+            <a:off x="546292" y="2905780"/>
             <a:ext cx="1909777" cy="523220"/>
           </a:xfrm>
           <a:prstGeom prst="rect">
@@ -14234,7 +14199,7 @@
           <a:lstStyle/>
           <a:p>
             <a:r>
-              <a:rPr lang="en-US" sz="2800" smtClean="0">
+              <a:rPr lang="en-US" sz="2800">
                 <a:solidFill>
                   <a:schemeClr val="tx2">
                     <a:lumMod val="75000"/>
@@ -14320,7 +14285,13 @@
       </p:sp>
       <p:pic>
         <p:nvPicPr>
-          <p:cNvPr id="2050" name="Picture 2" descr="https://scontent.fsgn2-4.fna.fbcdn.net/v/t1.15752-9/117196932_691878271395702_55767675683945254_n.png?_nc_cat=101&amp;_nc_sid=b96e70&amp;_nc_ohc=Cbp4XSyFQE8AX_0E8RD&amp;_nc_ht=scontent.fsgn2-4.fna&amp;oh=ae142ff03ee12cb38445722f44237053&amp;oe=5F529B60"/>
+          <p:cNvPr id="1026" name="Picture 2">
+            <a:extLst>
+              <a:ext uri="{FF2B5EF4-FFF2-40B4-BE49-F238E27FC236}">
+                <a16:creationId xmlns:a16="http://schemas.microsoft.com/office/drawing/2014/main" id="{95937709-71C1-4B2E-B5F8-A558086D4769}"/>
+              </a:ext>
+            </a:extLst>
+          </p:cNvPr>
           <p:cNvPicPr>
             <a:picLocks noChangeAspect="1" noChangeArrowheads="1"/>
           </p:cNvPicPr>
@@ -14341,8 +14312,8 @@
         </p:blipFill>
         <p:spPr bwMode="auto">
           <a:xfrm>
-            <a:off x="824552" y="1163945"/>
-            <a:ext cx="10593697" cy="4894120"/>
+            <a:off x="2610677" y="1298714"/>
+            <a:ext cx="8269357" cy="5264619"/>
           </a:xfrm>
           <a:prstGeom prst="rect">
             <a:avLst/>
@@ -14364,13 +14335,6 @@
   <p:clrMapOvr>
     <a:masterClrMapping/>
   </p:clrMapOvr>
-  <p:timing>
-    <p:tnLst>
-      <p:par>
-        <p:cTn id="1" dur="indefinite" restart="never" nodeType="tmRoot"/>
-      </p:par>
-    </p:tnLst>
-  </p:timing>
 </p:sld>
 </file>
 
@@ -14497,7 +14461,7 @@
           <a:lstStyle/>
           <a:p>
             <a:r>
-              <a:rPr lang="en-US" sz="2800" smtClean="0">
+              <a:rPr lang="en-US" sz="2800">
                 <a:hlinkClick r:id="rId3"/>
               </a:rPr>
               <a:t>Link vẽ</a:t>
@@ -14538,13 +14502,6 @@
   <p:clrMapOvr>
     <a:masterClrMapping/>
   </p:clrMapOvr>
-  <p:timing>
-    <p:tnLst>
-      <p:par>
-        <p:cTn id="1" dur="indefinite" restart="never" nodeType="tmRoot"/>
-      </p:par>
-    </p:tnLst>
-  </p:timing>
 </p:sld>
 </file>
 

</xml_diff>